<commit_message>
created end-position visualization, added keybinds
</commit_message>
<xml_diff>
--- a/GroupA-presentation.pptx
+++ b/GroupA-presentation.pptx
@@ -10,9 +10,11 @@
     <p:sldId id="260" r:id="rId4"/>
     <p:sldId id="279" r:id="rId5"/>
     <p:sldId id="278" r:id="rId6"/>
-    <p:sldId id="280" r:id="rId7"/>
-    <p:sldId id="276" r:id="rId8"/>
-    <p:sldId id="277" r:id="rId9"/>
+    <p:sldId id="281" r:id="rId7"/>
+    <p:sldId id="280" r:id="rId8"/>
+    <p:sldId id="282" r:id="rId9"/>
+    <p:sldId id="276" r:id="rId10"/>
+    <p:sldId id="277" r:id="rId11"/>
   </p:sldIdLst>
   <p:sldSz cx="12192000" cy="6858000"/>
   <p:notesSz cx="6858000" cy="9144000"/>
@@ -283,7 +285,7 @@
           <a:p>
             <a:fld id="{32637B58-87C1-446D-BDA9-B06F4BCF7782}" type="datetimeFigureOut">
               <a:rPr lang="en-US" smtClean="0"/>
-              <a:t>12/29/2024</a:t>
+              <a:t>1/3/2025</a:t>
             </a:fld>
             <a:endParaRPr lang="en-US"/>
           </a:p>
@@ -486,7 +488,7 @@
           <a:p>
             <a:fld id="{32637B58-87C1-446D-BDA9-B06F4BCF7782}" type="datetimeFigureOut">
               <a:rPr lang="en-US" smtClean="0"/>
-              <a:t>12/29/2024</a:t>
+              <a:t>1/3/2025</a:t>
             </a:fld>
             <a:endParaRPr lang="en-US"/>
           </a:p>
@@ -694,7 +696,7 @@
           <a:p>
             <a:fld id="{32637B58-87C1-446D-BDA9-B06F4BCF7782}" type="datetimeFigureOut">
               <a:rPr lang="en-US" smtClean="0"/>
-              <a:t>12/29/2024</a:t>
+              <a:t>1/3/2025</a:t>
             </a:fld>
             <a:endParaRPr lang="en-US"/>
           </a:p>
@@ -944,7 +946,7 @@
           <a:p>
             <a:fld id="{32637B58-87C1-446D-BDA9-B06F4BCF7782}" type="datetimeFigureOut">
               <a:rPr lang="en-US" smtClean="0"/>
-              <a:t>12/29/2024</a:t>
+              <a:t>1/3/2025</a:t>
             </a:fld>
             <a:endParaRPr lang="en-US"/>
           </a:p>
@@ -1248,7 +1250,7 @@
           <a:p>
             <a:fld id="{32637B58-87C1-446D-BDA9-B06F4BCF7782}" type="datetimeFigureOut">
               <a:rPr lang="en-US" smtClean="0"/>
-              <a:t>12/29/2024</a:t>
+              <a:t>1/3/2025</a:t>
             </a:fld>
             <a:endParaRPr lang="en-US"/>
           </a:p>
@@ -1515,7 +1517,7 @@
           <a:p>
             <a:fld id="{32637B58-87C1-446D-BDA9-B06F4BCF7782}" type="datetimeFigureOut">
               <a:rPr lang="en-US" smtClean="0"/>
-              <a:t>12/29/2024</a:t>
+              <a:t>1/3/2025</a:t>
             </a:fld>
             <a:endParaRPr lang="en-US"/>
           </a:p>
@@ -1970,7 +1972,7 @@
           <a:p>
             <a:fld id="{32637B58-87C1-446D-BDA9-B06F4BCF7782}" type="datetimeFigureOut">
               <a:rPr lang="en-US" smtClean="0"/>
-              <a:t>12/29/2024</a:t>
+              <a:t>1/3/2025</a:t>
             </a:fld>
             <a:endParaRPr lang="en-US"/>
           </a:p>
@@ -2111,7 +2113,7 @@
           <a:p>
             <a:fld id="{32637B58-87C1-446D-BDA9-B06F4BCF7782}" type="datetimeFigureOut">
               <a:rPr lang="en-US" smtClean="0"/>
-              <a:t>12/29/2024</a:t>
+              <a:t>1/3/2025</a:t>
             </a:fld>
             <a:endParaRPr lang="en-US"/>
           </a:p>
@@ -2224,7 +2226,7 @@
           <a:p>
             <a:fld id="{32637B58-87C1-446D-BDA9-B06F4BCF7782}" type="datetimeFigureOut">
               <a:rPr lang="en-US" smtClean="0"/>
-              <a:t>12/29/2024</a:t>
+              <a:t>1/3/2025</a:t>
             </a:fld>
             <a:endParaRPr lang="en-US"/>
           </a:p>
@@ -2535,7 +2537,7 @@
           <a:p>
             <a:fld id="{32637B58-87C1-446D-BDA9-B06F4BCF7782}" type="datetimeFigureOut">
               <a:rPr lang="en-US" smtClean="0"/>
-              <a:t>12/29/2024</a:t>
+              <a:t>1/3/2025</a:t>
             </a:fld>
             <a:endParaRPr lang="en-US"/>
           </a:p>
@@ -2826,7 +2828,7 @@
           <a:p>
             <a:fld id="{32637B58-87C1-446D-BDA9-B06F4BCF7782}" type="datetimeFigureOut">
               <a:rPr lang="en-US" smtClean="0"/>
-              <a:t>12/29/2024</a:t>
+              <a:t>1/3/2025</a:t>
             </a:fld>
             <a:endParaRPr lang="en-US"/>
           </a:p>
@@ -3237,7 +3239,7 @@
             <a:fld id="{32637B58-87C1-446D-BDA9-B06F4BCF7782}" type="datetimeFigureOut">
               <a:rPr lang="en-US" smtClean="0"/>
               <a:pPr/>
-              <a:t>12/29/2024</a:t>
+              <a:t>1/3/2025</a:t>
             </a:fld>
             <a:endParaRPr lang="en-US" dirty="0"/>
           </a:p>
@@ -3891,6 +3893,91 @@
 </p:sld>
 </file>
 
+<file path=ppt/slides/slide10.xml><?xml version="1.0" encoding="utf-8"?>
+<p:sld xmlns:a="http://schemas.openxmlformats.org/drawingml/2006/main" xmlns:r="http://schemas.openxmlformats.org/officeDocument/2006/relationships" xmlns:p="http://schemas.openxmlformats.org/presentationml/2006/main">
+  <p:cSld>
+    <p:spTree>
+      <p:nvGrpSpPr>
+        <p:cNvPr id="1" name=""/>
+        <p:cNvGrpSpPr/>
+        <p:nvPr/>
+      </p:nvGrpSpPr>
+      <p:grpSpPr>
+        <a:xfrm>
+          <a:off x="0" y="0"/>
+          <a:ext cx="0" cy="0"/>
+          <a:chOff x="0" y="0"/>
+          <a:chExt cx="0" cy="0"/>
+        </a:xfrm>
+      </p:grpSpPr>
+      <p:sp>
+        <p:nvSpPr>
+          <p:cNvPr id="2" name="Title 1">
+            <a:extLst>
+              <a:ext uri="{FF2B5EF4-FFF2-40B4-BE49-F238E27FC236}">
+                <a16:creationId xmlns:a16="http://schemas.microsoft.com/office/drawing/2014/main" id="{427B556E-14F6-F617-A0C9-A64626166D74}"/>
+              </a:ext>
+            </a:extLst>
+          </p:cNvPr>
+          <p:cNvSpPr>
+            <a:spLocks noGrp="1"/>
+          </p:cNvSpPr>
+          <p:nvPr>
+            <p:ph type="title"/>
+          </p:nvPr>
+        </p:nvSpPr>
+        <p:spPr/>
+        <p:txBody>
+          <a:bodyPr/>
+          <a:lstStyle/>
+          <a:p>
+            <a:r>
+              <a:rPr lang="en-US" dirty="0">
+                <a:latin typeface="Trebuchet MS" panose="020B0603020202020204" pitchFamily="34" charset="0"/>
+              </a:rPr>
+              <a:t>Thank you for your attention</a:t>
+            </a:r>
+          </a:p>
+        </p:txBody>
+      </p:sp>
+      <p:sp>
+        <p:nvSpPr>
+          <p:cNvPr id="3" name="Text Placeholder 2">
+            <a:extLst>
+              <a:ext uri="{FF2B5EF4-FFF2-40B4-BE49-F238E27FC236}">
+                <a16:creationId xmlns:a16="http://schemas.microsoft.com/office/drawing/2014/main" id="{BC889EB6-9A67-D64C-305A-81C2CEF39489}"/>
+              </a:ext>
+            </a:extLst>
+          </p:cNvPr>
+          <p:cNvSpPr>
+            <a:spLocks noGrp="1"/>
+          </p:cNvSpPr>
+          <p:nvPr>
+            <p:ph type="body" idx="1"/>
+          </p:nvPr>
+        </p:nvSpPr>
+        <p:spPr/>
+        <p:txBody>
+          <a:bodyPr/>
+          <a:lstStyle/>
+          <a:p>
+            <a:endParaRPr lang="en-US"/>
+          </a:p>
+        </p:txBody>
+      </p:sp>
+    </p:spTree>
+    <p:extLst>
+      <p:ext uri="{BB962C8B-B14F-4D97-AF65-F5344CB8AC3E}">
+        <p14:creationId xmlns:p14="http://schemas.microsoft.com/office/powerpoint/2010/main" val="1403304922"/>
+      </p:ext>
+    </p:extLst>
+  </p:cSld>
+  <p:clrMapOvr>
+    <a:masterClrMapping/>
+  </p:clrMapOvr>
+</p:sld>
+</file>
+
 <file path=ppt/slides/slide2.xml><?xml version="1.0" encoding="utf-8"?>
 <p:sld xmlns:a="http://schemas.openxmlformats.org/drawingml/2006/main" xmlns:r="http://schemas.openxmlformats.org/officeDocument/2006/relationships" xmlns:p="http://schemas.openxmlformats.org/presentationml/2006/main">
   <p:cSld>
@@ -4078,7 +4165,7 @@
           <a:p>
             <a:r>
               <a:rPr lang="en-US" dirty="0"/>
-              <a:t>Give user option to control leader and to place police agents as barricades anywhere on the map</a:t>
+              <a:t>Give user the option to control leader and to place police agents as barricades anywhere on the map</a:t>
             </a:r>
           </a:p>
           <a:p>
@@ -4114,6 +4201,21 @@
             <a:r>
               <a:rPr lang="en-US" dirty="0"/>
               <a:t> – Social Crowd Simulation (2024)</a:t>
+            </a:r>
+          </a:p>
+          <a:p>
+            <a:pPr lvl="1"/>
+            <a:r>
+              <a:rPr lang="en-US" dirty="0"/>
+              <a:t>Clements, </a:t>
+            </a:r>
+            <a:r>
+              <a:rPr lang="en-US" dirty="0" err="1"/>
+              <a:t>Fadai</a:t>
+            </a:r>
+            <a:r>
+              <a:rPr lang="en-US" dirty="0"/>
+              <a:t> – Agent-based modelling of sports riots (2022)</a:t>
             </a:r>
           </a:p>
           <a:p>
@@ -4341,20 +4443,49 @@
           <a:p>
             <a:r>
               <a:rPr lang="en-US" dirty="0"/>
-              <a:t>Arbitrary movement for leader</a:t>
-            </a:r>
-          </a:p>
-          <a:p>
+              <a:t>End-position-seeking-</a:t>
+            </a:r>
+            <a:r>
+              <a:rPr lang="en-US" dirty="0" err="1"/>
+              <a:t>behaviour</a:t>
+            </a:r>
             <a:endParaRPr lang="en-US" dirty="0"/>
           </a:p>
           <a:p>
-            <a:r>
-              <a:rPr lang="en-US" dirty="0"/>
-              <a:t>…video</a:t>
-            </a:r>
-          </a:p>
-        </p:txBody>
-      </p:sp>
+            <a:endParaRPr lang="en-US" dirty="0"/>
+          </a:p>
+        </p:txBody>
+      </p:sp>
+      <p:pic>
+        <p:nvPicPr>
+          <p:cNvPr id="5" name="Picture 4">
+            <a:extLst>
+              <a:ext uri="{FF2B5EF4-FFF2-40B4-BE49-F238E27FC236}">
+                <a16:creationId xmlns:a16="http://schemas.microsoft.com/office/drawing/2014/main" id="{A36D0F5A-A549-72B7-4DAF-92662CD3D45E}"/>
+              </a:ext>
+            </a:extLst>
+          </p:cNvPr>
+          <p:cNvPicPr>
+            <a:picLocks noChangeAspect="1"/>
+          </p:cNvPicPr>
+          <p:nvPr/>
+        </p:nvPicPr>
+        <p:blipFill>
+          <a:blip r:embed="rId2"/>
+          <a:stretch>
+            <a:fillRect/>
+          </a:stretch>
+        </p:blipFill>
+        <p:spPr>
+          <a:xfrm>
+            <a:off x="584466" y="2497577"/>
+            <a:ext cx="11439525" cy="4162425"/>
+          </a:xfrm>
+          <a:prstGeom prst="rect">
+            <a:avLst/>
+          </a:prstGeom>
+        </p:spPr>
+      </p:pic>
     </p:spTree>
     <p:extLst>
       <p:ext uri="{BB962C8B-B14F-4D97-AF65-F5344CB8AC3E}">
@@ -4369,6 +4500,109 @@
 </file>
 
 <file path=ppt/slides/slide6.xml><?xml version="1.0" encoding="utf-8"?>
+<p:sld xmlns:a="http://schemas.openxmlformats.org/drawingml/2006/main" xmlns:r="http://schemas.openxmlformats.org/officeDocument/2006/relationships" xmlns:p="http://schemas.openxmlformats.org/presentationml/2006/main">
+  <p:cSld>
+    <p:spTree>
+      <p:nvGrpSpPr>
+        <p:cNvPr id="1" name="">
+          <a:extLst>
+            <a:ext uri="{FF2B5EF4-FFF2-40B4-BE49-F238E27FC236}">
+              <a16:creationId xmlns:a16="http://schemas.microsoft.com/office/drawing/2014/main" id="{9238F1D7-EE7E-3455-733C-4E308796772E}"/>
+            </a:ext>
+          </a:extLst>
+        </p:cNvPr>
+        <p:cNvGrpSpPr/>
+        <p:nvPr/>
+      </p:nvGrpSpPr>
+      <p:grpSpPr>
+        <a:xfrm>
+          <a:off x="0" y="0"/>
+          <a:ext cx="0" cy="0"/>
+          <a:chOff x="0" y="0"/>
+          <a:chExt cx="0" cy="0"/>
+        </a:xfrm>
+      </p:grpSpPr>
+      <p:sp>
+        <p:nvSpPr>
+          <p:cNvPr id="2" name="Title 1">
+            <a:extLst>
+              <a:ext uri="{FF2B5EF4-FFF2-40B4-BE49-F238E27FC236}">
+                <a16:creationId xmlns:a16="http://schemas.microsoft.com/office/drawing/2014/main" id="{73DA8B9E-6130-D1C4-223F-5115E659EB7C}"/>
+              </a:ext>
+            </a:extLst>
+          </p:cNvPr>
+          <p:cNvSpPr>
+            <a:spLocks noGrp="1"/>
+          </p:cNvSpPr>
+          <p:nvPr>
+            <p:ph type="title"/>
+          </p:nvPr>
+        </p:nvSpPr>
+        <p:spPr/>
+        <p:txBody>
+          <a:bodyPr/>
+          <a:lstStyle/>
+          <a:p>
+            <a:r>
+              <a:rPr lang="en-US" dirty="0">
+                <a:latin typeface="Trebuchet MS" panose="020B0603020202020204" pitchFamily="34" charset="0"/>
+              </a:rPr>
+              <a:t>Results</a:t>
+            </a:r>
+          </a:p>
+        </p:txBody>
+      </p:sp>
+      <p:sp>
+        <p:nvSpPr>
+          <p:cNvPr id="3" name="Content Placeholder 2">
+            <a:extLst>
+              <a:ext uri="{FF2B5EF4-FFF2-40B4-BE49-F238E27FC236}">
+                <a16:creationId xmlns:a16="http://schemas.microsoft.com/office/drawing/2014/main" id="{FC607E13-5D85-7B89-57D8-D52A7634453B}"/>
+              </a:ext>
+            </a:extLst>
+          </p:cNvPr>
+          <p:cNvSpPr>
+            <a:spLocks noGrp="1"/>
+          </p:cNvSpPr>
+          <p:nvPr>
+            <p:ph idx="1"/>
+          </p:nvPr>
+        </p:nvSpPr>
+        <p:spPr/>
+        <p:txBody>
+          <a:bodyPr/>
+          <a:lstStyle/>
+          <a:p>
+            <a:r>
+              <a:rPr lang="en-US" dirty="0"/>
+              <a:t>Arbitrary movement for leader</a:t>
+            </a:r>
+          </a:p>
+          <a:p>
+            <a:endParaRPr lang="en-US" dirty="0"/>
+          </a:p>
+          <a:p>
+            <a:r>
+              <a:rPr lang="en-US" dirty="0"/>
+              <a:t>…video</a:t>
+            </a:r>
+          </a:p>
+        </p:txBody>
+      </p:sp>
+    </p:spTree>
+    <p:extLst>
+      <p:ext uri="{BB962C8B-B14F-4D97-AF65-F5344CB8AC3E}">
+        <p14:creationId xmlns:p14="http://schemas.microsoft.com/office/powerpoint/2010/main" val="4012959857"/>
+      </p:ext>
+    </p:extLst>
+  </p:cSld>
+  <p:clrMapOvr>
+    <a:masterClrMapping/>
+  </p:clrMapOvr>
+</p:sld>
+</file>
+
+<file path=ppt/slides/slide7.xml><?xml version="1.0" encoding="utf-8"?>
 <p:sld xmlns:a="http://schemas.openxmlformats.org/drawingml/2006/main" xmlns:r="http://schemas.openxmlformats.org/officeDocument/2006/relationships" xmlns:p="http://schemas.openxmlformats.org/presentationml/2006/main">
   <p:cSld>
     <p:spTree>
@@ -4471,7 +4705,102 @@
 </p:sld>
 </file>
 
-<file path=ppt/slides/slide7.xml><?xml version="1.0" encoding="utf-8"?>
+<file path=ppt/slides/slide8.xml><?xml version="1.0" encoding="utf-8"?>
+<p:sld xmlns:a="http://schemas.openxmlformats.org/drawingml/2006/main" xmlns:r="http://schemas.openxmlformats.org/officeDocument/2006/relationships" xmlns:p="http://schemas.openxmlformats.org/presentationml/2006/main">
+  <p:cSld>
+    <p:spTree>
+      <p:nvGrpSpPr>
+        <p:cNvPr id="1" name="">
+          <a:extLst>
+            <a:ext uri="{FF2B5EF4-FFF2-40B4-BE49-F238E27FC236}">
+              <a16:creationId xmlns:a16="http://schemas.microsoft.com/office/drawing/2014/main" id="{E27F8262-C469-B430-19A2-E39472460DBE}"/>
+            </a:ext>
+          </a:extLst>
+        </p:cNvPr>
+        <p:cNvGrpSpPr/>
+        <p:nvPr/>
+      </p:nvGrpSpPr>
+      <p:grpSpPr>
+        <a:xfrm>
+          <a:off x="0" y="0"/>
+          <a:ext cx="0" cy="0"/>
+          <a:chOff x="0" y="0"/>
+          <a:chExt cx="0" cy="0"/>
+        </a:xfrm>
+      </p:grpSpPr>
+      <p:sp>
+        <p:nvSpPr>
+          <p:cNvPr id="2" name="Title 1">
+            <a:extLst>
+              <a:ext uri="{FF2B5EF4-FFF2-40B4-BE49-F238E27FC236}">
+                <a16:creationId xmlns:a16="http://schemas.microsoft.com/office/drawing/2014/main" id="{C8D971A7-C046-479B-8FC0-8047EE053FAB}"/>
+              </a:ext>
+            </a:extLst>
+          </p:cNvPr>
+          <p:cNvSpPr>
+            <a:spLocks noGrp="1"/>
+          </p:cNvSpPr>
+          <p:nvPr>
+            <p:ph type="title"/>
+          </p:nvPr>
+        </p:nvSpPr>
+        <p:spPr/>
+        <p:txBody>
+          <a:bodyPr/>
+          <a:lstStyle/>
+          <a:p>
+            <a:r>
+              <a:rPr lang="en-US" dirty="0">
+                <a:latin typeface="Trebuchet MS" panose="020B0603020202020204" pitchFamily="34" charset="0"/>
+              </a:rPr>
+              <a:t>Results</a:t>
+            </a:r>
+          </a:p>
+        </p:txBody>
+      </p:sp>
+      <p:sp>
+        <p:nvSpPr>
+          <p:cNvPr id="3" name="Content Placeholder 2">
+            <a:extLst>
+              <a:ext uri="{FF2B5EF4-FFF2-40B4-BE49-F238E27FC236}">
+                <a16:creationId xmlns:a16="http://schemas.microsoft.com/office/drawing/2014/main" id="{0CCA4659-2BEC-2986-981D-A4232C99F0E8}"/>
+              </a:ext>
+            </a:extLst>
+          </p:cNvPr>
+          <p:cNvSpPr>
+            <a:spLocks noGrp="1"/>
+          </p:cNvSpPr>
+          <p:nvPr>
+            <p:ph idx="1"/>
+          </p:nvPr>
+        </p:nvSpPr>
+        <p:spPr/>
+        <p:txBody>
+          <a:bodyPr/>
+          <a:lstStyle/>
+          <a:p>
+            <a:r>
+              <a:rPr lang="en-US"/>
+              <a:t>Leader hierarchy</a:t>
+            </a:r>
+            <a:endParaRPr lang="en-US" dirty="0"/>
+          </a:p>
+        </p:txBody>
+      </p:sp>
+    </p:spTree>
+    <p:extLst>
+      <p:ext uri="{BB962C8B-B14F-4D97-AF65-F5344CB8AC3E}">
+        <p14:creationId xmlns:p14="http://schemas.microsoft.com/office/powerpoint/2010/main" val="3898129426"/>
+      </p:ext>
+    </p:extLst>
+  </p:cSld>
+  <p:clrMapOvr>
+    <a:masterClrMapping/>
+  </p:clrMapOvr>
+</p:sld>
+</file>
+
+<file path=ppt/slides/slide9.xml><?xml version="1.0" encoding="utf-8"?>
 <p:sld xmlns:a="http://schemas.openxmlformats.org/drawingml/2006/main" xmlns:r="http://schemas.openxmlformats.org/officeDocument/2006/relationships" xmlns:p="http://schemas.openxmlformats.org/presentationml/2006/main">
   <p:cSld>
     <p:spTree>
@@ -4574,6 +4903,13 @@
           </a:p>
           <a:p>
             <a:pPr lvl="1"/>
+            <a:r>
+              <a:rPr lang="en-US" dirty="0"/>
+              <a:t>Introduce uncertainty into vision</a:t>
+            </a:r>
+          </a:p>
+          <a:p>
+            <a:pPr lvl="1"/>
             <a:endParaRPr lang="en-US" dirty="0"/>
           </a:p>
         </p:txBody>
@@ -4582,91 +4918,6 @@
     <p:extLst>
       <p:ext uri="{BB962C8B-B14F-4D97-AF65-F5344CB8AC3E}">
         <p14:creationId xmlns:p14="http://schemas.microsoft.com/office/powerpoint/2010/main" val="1742204147"/>
-      </p:ext>
-    </p:extLst>
-  </p:cSld>
-  <p:clrMapOvr>
-    <a:masterClrMapping/>
-  </p:clrMapOvr>
-</p:sld>
-</file>
-
-<file path=ppt/slides/slide8.xml><?xml version="1.0" encoding="utf-8"?>
-<p:sld xmlns:a="http://schemas.openxmlformats.org/drawingml/2006/main" xmlns:r="http://schemas.openxmlformats.org/officeDocument/2006/relationships" xmlns:p="http://schemas.openxmlformats.org/presentationml/2006/main">
-  <p:cSld>
-    <p:spTree>
-      <p:nvGrpSpPr>
-        <p:cNvPr id="1" name=""/>
-        <p:cNvGrpSpPr/>
-        <p:nvPr/>
-      </p:nvGrpSpPr>
-      <p:grpSpPr>
-        <a:xfrm>
-          <a:off x="0" y="0"/>
-          <a:ext cx="0" cy="0"/>
-          <a:chOff x="0" y="0"/>
-          <a:chExt cx="0" cy="0"/>
-        </a:xfrm>
-      </p:grpSpPr>
-      <p:sp>
-        <p:nvSpPr>
-          <p:cNvPr id="2" name="Title 1">
-            <a:extLst>
-              <a:ext uri="{FF2B5EF4-FFF2-40B4-BE49-F238E27FC236}">
-                <a16:creationId xmlns:a16="http://schemas.microsoft.com/office/drawing/2014/main" id="{427B556E-14F6-F617-A0C9-A64626166D74}"/>
-              </a:ext>
-            </a:extLst>
-          </p:cNvPr>
-          <p:cNvSpPr>
-            <a:spLocks noGrp="1"/>
-          </p:cNvSpPr>
-          <p:nvPr>
-            <p:ph type="title"/>
-          </p:nvPr>
-        </p:nvSpPr>
-        <p:spPr/>
-        <p:txBody>
-          <a:bodyPr/>
-          <a:lstStyle/>
-          <a:p>
-            <a:r>
-              <a:rPr lang="en-US" dirty="0">
-                <a:latin typeface="Trebuchet MS" panose="020B0603020202020204" pitchFamily="34" charset="0"/>
-              </a:rPr>
-              <a:t>Thank you for your attention</a:t>
-            </a:r>
-          </a:p>
-        </p:txBody>
-      </p:sp>
-      <p:sp>
-        <p:nvSpPr>
-          <p:cNvPr id="3" name="Text Placeholder 2">
-            <a:extLst>
-              <a:ext uri="{FF2B5EF4-FFF2-40B4-BE49-F238E27FC236}">
-                <a16:creationId xmlns:a16="http://schemas.microsoft.com/office/drawing/2014/main" id="{BC889EB6-9A67-D64C-305A-81C2CEF39489}"/>
-              </a:ext>
-            </a:extLst>
-          </p:cNvPr>
-          <p:cNvSpPr>
-            <a:spLocks noGrp="1"/>
-          </p:cNvSpPr>
-          <p:nvPr>
-            <p:ph type="body" idx="1"/>
-          </p:nvPr>
-        </p:nvSpPr>
-        <p:spPr/>
-        <p:txBody>
-          <a:bodyPr/>
-          <a:lstStyle/>
-          <a:p>
-            <a:endParaRPr lang="en-US"/>
-          </a:p>
-        </p:txBody>
-      </p:sp>
-    </p:spTree>
-    <p:extLst>
-      <p:ext uri="{BB962C8B-B14F-4D97-AF65-F5344CB8AC3E}">
-        <p14:creationId xmlns:p14="http://schemas.microsoft.com/office/powerpoint/2010/main" val="1403304922"/>
       </p:ext>
     </p:extLst>
   </p:cSld>

</xml_diff>

<commit_message>
docs: Continuing project slides
</commit_message>
<xml_diff>
--- a/GroupA-presentation.pptx
+++ b/GroupA-presentation.pptx
@@ -13,12 +13,15 @@
     <p:sldId id="284" r:id="rId7"/>
     <p:sldId id="286" r:id="rId8"/>
     <p:sldId id="285" r:id="rId9"/>
-    <p:sldId id="278" r:id="rId10"/>
-    <p:sldId id="281" r:id="rId11"/>
-    <p:sldId id="280" r:id="rId12"/>
-    <p:sldId id="282" r:id="rId13"/>
-    <p:sldId id="276" r:id="rId14"/>
-    <p:sldId id="277" r:id="rId15"/>
+    <p:sldId id="287" r:id="rId10"/>
+    <p:sldId id="288" r:id="rId11"/>
+    <p:sldId id="289" r:id="rId12"/>
+    <p:sldId id="290" r:id="rId13"/>
+    <p:sldId id="281" r:id="rId14"/>
+    <p:sldId id="280" r:id="rId15"/>
+    <p:sldId id="282" r:id="rId16"/>
+    <p:sldId id="276" r:id="rId17"/>
+    <p:sldId id="277" r:id="rId18"/>
   </p:sldIdLst>
   <p:sldSz cx="12192000" cy="6858000"/>
   <p:notesSz cx="6858000" cy="9144000"/>
@@ -125,6 +128,14 @@
 </p:presentation>
 </file>
 
+<file path=ppt/revisionInfo.xml><?xml version="1.0" encoding="utf-8"?>
+<p1510:revInfo xmlns:a="http://schemas.openxmlformats.org/drawingml/2006/main" xmlns:r="http://schemas.openxmlformats.org/officeDocument/2006/relationships" xmlns:p1510="http://schemas.microsoft.com/office/powerpoint/2015/10/main">
+  <p1510:revLst>
+    <p1510:client id="{25839CB5-EC5B-7E59-43DA-81865C22CA37}" v="11" dt="2025-01-09T21:21:06.048"/>
+  </p1510:revLst>
+</p1510:revInfo>
+</file>
+
 <file path=ppt/slideLayouts/slideLayout1.xml><?xml version="1.0" encoding="utf-8"?>
 <p:sldLayout xmlns:a="http://schemas.openxmlformats.org/drawingml/2006/main" xmlns:r="http://schemas.openxmlformats.org/officeDocument/2006/relationships" xmlns:p="http://schemas.openxmlformats.org/presentationml/2006/main" type="title" preserve="1">
   <p:cSld name="Title Slide">
@@ -289,7 +300,7 @@
           <a:p>
             <a:fld id="{32637B58-87C1-446D-BDA9-B06F4BCF7782}" type="datetimeFigureOut">
               <a:rPr lang="en-US" smtClean="0"/>
-              <a:t>1/7/2025</a:t>
+              <a:t>1/9/2025</a:t>
             </a:fld>
             <a:endParaRPr lang="en-US"/>
           </a:p>
@@ -492,7 +503,7 @@
           <a:p>
             <a:fld id="{32637B58-87C1-446D-BDA9-B06F4BCF7782}" type="datetimeFigureOut">
               <a:rPr lang="en-US" smtClean="0"/>
-              <a:t>1/7/2025</a:t>
+              <a:t>1/9/2025</a:t>
             </a:fld>
             <a:endParaRPr lang="en-US"/>
           </a:p>
@@ -700,7 +711,7 @@
           <a:p>
             <a:fld id="{32637B58-87C1-446D-BDA9-B06F4BCF7782}" type="datetimeFigureOut">
               <a:rPr lang="en-US" smtClean="0"/>
-              <a:t>1/7/2025</a:t>
+              <a:t>1/9/2025</a:t>
             </a:fld>
             <a:endParaRPr lang="en-US"/>
           </a:p>
@@ -950,7 +961,7 @@
           <a:p>
             <a:fld id="{32637B58-87C1-446D-BDA9-B06F4BCF7782}" type="datetimeFigureOut">
               <a:rPr lang="en-US" smtClean="0"/>
-              <a:t>1/7/2025</a:t>
+              <a:t>1/9/2025</a:t>
             </a:fld>
             <a:endParaRPr lang="en-US"/>
           </a:p>
@@ -1254,7 +1265,7 @@
           <a:p>
             <a:fld id="{32637B58-87C1-446D-BDA9-B06F4BCF7782}" type="datetimeFigureOut">
               <a:rPr lang="en-US" smtClean="0"/>
-              <a:t>1/7/2025</a:t>
+              <a:t>1/9/2025</a:t>
             </a:fld>
             <a:endParaRPr lang="en-US"/>
           </a:p>
@@ -1521,7 +1532,7 @@
           <a:p>
             <a:fld id="{32637B58-87C1-446D-BDA9-B06F4BCF7782}" type="datetimeFigureOut">
               <a:rPr lang="en-US" smtClean="0"/>
-              <a:t>1/7/2025</a:t>
+              <a:t>1/9/2025</a:t>
             </a:fld>
             <a:endParaRPr lang="en-US"/>
           </a:p>
@@ -1976,7 +1987,7 @@
           <a:p>
             <a:fld id="{32637B58-87C1-446D-BDA9-B06F4BCF7782}" type="datetimeFigureOut">
               <a:rPr lang="en-US" smtClean="0"/>
-              <a:t>1/7/2025</a:t>
+              <a:t>1/9/2025</a:t>
             </a:fld>
             <a:endParaRPr lang="en-US"/>
           </a:p>
@@ -2117,7 +2128,7 @@
           <a:p>
             <a:fld id="{32637B58-87C1-446D-BDA9-B06F4BCF7782}" type="datetimeFigureOut">
               <a:rPr lang="en-US" smtClean="0"/>
-              <a:t>1/7/2025</a:t>
+              <a:t>1/9/2025</a:t>
             </a:fld>
             <a:endParaRPr lang="en-US"/>
           </a:p>
@@ -2230,7 +2241,7 @@
           <a:p>
             <a:fld id="{32637B58-87C1-446D-BDA9-B06F4BCF7782}" type="datetimeFigureOut">
               <a:rPr lang="en-US" smtClean="0"/>
-              <a:t>1/7/2025</a:t>
+              <a:t>1/9/2025</a:t>
             </a:fld>
             <a:endParaRPr lang="en-US"/>
           </a:p>
@@ -2541,7 +2552,7 @@
           <a:p>
             <a:fld id="{32637B58-87C1-446D-BDA9-B06F4BCF7782}" type="datetimeFigureOut">
               <a:rPr lang="en-US" smtClean="0"/>
-              <a:t>1/7/2025</a:t>
+              <a:t>1/9/2025</a:t>
             </a:fld>
             <a:endParaRPr lang="en-US"/>
           </a:p>
@@ -2832,7 +2843,7 @@
           <a:p>
             <a:fld id="{32637B58-87C1-446D-BDA9-B06F4BCF7782}" type="datetimeFigureOut">
               <a:rPr lang="en-US" smtClean="0"/>
-              <a:t>1/7/2025</a:t>
+              <a:t>1/9/2025</a:t>
             </a:fld>
             <a:endParaRPr lang="en-US"/>
           </a:p>
@@ -3243,7 +3254,7 @@
             <a:fld id="{32637B58-87C1-446D-BDA9-B06F4BCF7782}" type="datetimeFigureOut">
               <a:rPr lang="en-US" smtClean="0"/>
               <a:pPr/>
-              <a:t>1/7/2025</a:t>
+              <a:t>1/9/2025</a:t>
             </a:fld>
             <a:endParaRPr lang="en-US" dirty="0"/>
           </a:p>
@@ -3920,12 +3931,43 @@
           <a:chExt cx="0" cy="0"/>
         </a:xfrm>
       </p:grpSpPr>
-      <p:sp>
-        <p:nvSpPr>
-          <p:cNvPr id="2" name="Title 1">
-            <a:extLst>
-              <a:ext uri="{FF2B5EF4-FFF2-40B4-BE49-F238E27FC236}">
-                <a16:creationId xmlns:a16="http://schemas.microsoft.com/office/drawing/2014/main" id="{73DA8B9E-6130-D1C4-223F-5115E659EB7C}"/>
+      <p:pic>
+        <p:nvPicPr>
+          <p:cNvPr id="24" name="Online Media 23" title="Leader identification">
+            <a:hlinkClick r:id="" action="ppaction://media"/>
+            <a:extLst>
+              <a:ext uri="{FF2B5EF4-FFF2-40B4-BE49-F238E27FC236}">
+                <a16:creationId xmlns:a16="http://schemas.microsoft.com/office/drawing/2014/main" id="{9E0EE744-FFE2-466F-9D5E-EB36FE954B06}"/>
+              </a:ext>
+            </a:extLst>
+          </p:cNvPr>
+          <p:cNvPicPr>
+            <a:picLocks noGrp="1" noRot="1" noChangeAspect="1"/>
+          </p:cNvPicPr>
+          <p:nvPr>
+            <p:ph idx="1"/>
+            <a:videoFile r:link="rId1"/>
+          </p:nvPr>
+        </p:nvPicPr>
+        <p:blipFill>
+          <a:blip r:embed="rId3"/>
+          <a:stretch>
+            <a:fillRect/>
+          </a:stretch>
+        </p:blipFill>
+        <p:spPr>
+          <a:xfrm>
+            <a:off x="1859995" y="1823113"/>
+            <a:ext cx="8016935" cy="4486829"/>
+          </a:xfrm>
+        </p:spPr>
+      </p:pic>
+      <p:sp>
+        <p:nvSpPr>
+          <p:cNvPr id="13" name="Title 1">
+            <a:extLst>
+              <a:ext uri="{FF2B5EF4-FFF2-40B4-BE49-F238E27FC236}">
+                <a16:creationId xmlns:a16="http://schemas.microsoft.com/office/drawing/2014/main" id="{356C4F04-EF87-08BA-9024-875DAE4A1052}"/>
               </a:ext>
             </a:extLst>
           </p:cNvPr>
@@ -3936,53 +3978,21 @@
             <p:ph type="title"/>
           </p:nvPr>
         </p:nvSpPr>
-        <p:spPr/>
+        <p:spPr>
+          <a:xfrm>
+            <a:off x="905256" y="590668"/>
+            <a:ext cx="9914859" cy="1329004"/>
+          </a:xfrm>
+        </p:spPr>
         <p:txBody>
           <a:bodyPr/>
           <a:lstStyle/>
           <a:p>
             <a:r>
               <a:rPr lang="en-US" dirty="0">
-                <a:latin typeface="Trebuchet MS" panose="020B0603020202020204" pitchFamily="34" charset="0"/>
+                <a:latin typeface="Trebuchet MS"/>
               </a:rPr>
-              <a:t>Results</a:t>
-            </a:r>
-          </a:p>
-        </p:txBody>
-      </p:sp>
-      <p:sp>
-        <p:nvSpPr>
-          <p:cNvPr id="3" name="Content Placeholder 2">
-            <a:extLst>
-              <a:ext uri="{FF2B5EF4-FFF2-40B4-BE49-F238E27FC236}">
-                <a16:creationId xmlns:a16="http://schemas.microsoft.com/office/drawing/2014/main" id="{FC607E13-5D85-7B89-57D8-D52A7634453B}"/>
-              </a:ext>
-            </a:extLst>
-          </p:cNvPr>
-          <p:cNvSpPr>
-            <a:spLocks noGrp="1"/>
-          </p:cNvSpPr>
-          <p:nvPr>
-            <p:ph idx="1"/>
-          </p:nvPr>
-        </p:nvSpPr>
-        <p:spPr/>
-        <p:txBody>
-          <a:bodyPr/>
-          <a:lstStyle/>
-          <a:p>
-            <a:r>
-              <a:rPr lang="en-US" dirty="0"/>
-              <a:t>Arbitrary movement for leader</a:t>
-            </a:r>
-          </a:p>
-          <a:p>
-            <a:endParaRPr lang="en-US" dirty="0"/>
-          </a:p>
-          <a:p>
-            <a:r>
-              <a:rPr lang="en-US" dirty="0"/>
-              <a:t>…video</a:t>
+              <a:t>Leader identification</a:t>
             </a:r>
           </a:p>
         </p:txBody>
@@ -3990,7 +4000,7 @@
     </p:spTree>
     <p:extLst>
       <p:ext uri="{BB962C8B-B14F-4D97-AF65-F5344CB8AC3E}">
-        <p14:creationId xmlns:p14="http://schemas.microsoft.com/office/powerpoint/2010/main" val="4012959857"/>
+        <p14:creationId xmlns:p14="http://schemas.microsoft.com/office/powerpoint/2010/main" val="2138142113"/>
       </p:ext>
     </p:extLst>
   </p:cSld>
@@ -4023,6 +4033,307 @@
           <a:chExt cx="0" cy="0"/>
         </a:xfrm>
       </p:grpSpPr>
+      <p:pic>
+        <p:nvPicPr>
+          <p:cNvPr id="4" name="Online Media 3" title="Protest end">
+            <a:hlinkClick r:id="" action="ppaction://media"/>
+            <a:extLst>
+              <a:ext uri="{FF2B5EF4-FFF2-40B4-BE49-F238E27FC236}">
+                <a16:creationId xmlns:a16="http://schemas.microsoft.com/office/drawing/2014/main" id="{6DAB5003-6DBD-CFFF-6B48-4FEFB2FAD06A}"/>
+              </a:ext>
+            </a:extLst>
+          </p:cNvPr>
+          <p:cNvPicPr>
+            <a:picLocks noGrp="1" noRot="1" noChangeAspect="1"/>
+          </p:cNvPicPr>
+          <p:nvPr>
+            <p:ph idx="1"/>
+            <a:videoFile r:link="rId1"/>
+          </p:nvPr>
+        </p:nvPicPr>
+        <p:blipFill>
+          <a:blip r:embed="rId3"/>
+          <a:stretch>
+            <a:fillRect/>
+          </a:stretch>
+        </p:blipFill>
+        <p:spPr>
+          <a:xfrm>
+            <a:off x="1860873" y="1822424"/>
+            <a:ext cx="8022579" cy="4473036"/>
+          </a:xfrm>
+        </p:spPr>
+      </p:pic>
+      <p:sp>
+        <p:nvSpPr>
+          <p:cNvPr id="2" name="Title 1">
+            <a:extLst>
+              <a:ext uri="{FF2B5EF4-FFF2-40B4-BE49-F238E27FC236}">
+                <a16:creationId xmlns:a16="http://schemas.microsoft.com/office/drawing/2014/main" id="{1FE6C1E6-E6A6-ADAA-F14A-E3D9EA6E60D0}"/>
+              </a:ext>
+            </a:extLst>
+          </p:cNvPr>
+          <p:cNvSpPr>
+            <a:spLocks noGrp="1"/>
+          </p:cNvSpPr>
+          <p:nvPr>
+            <p:ph type="title"/>
+          </p:nvPr>
+        </p:nvSpPr>
+        <p:spPr/>
+        <p:txBody>
+          <a:bodyPr/>
+          <a:lstStyle/>
+          <a:p>
+            <a:r>
+              <a:rPr lang="en-US" dirty="0">
+                <a:latin typeface="Trebuchet MS"/>
+              </a:rPr>
+              <a:t>Protest conclusion</a:t>
+            </a:r>
+            <a:endParaRPr lang="en-US" dirty="0">
+              <a:latin typeface="Trebuchet MS" panose="020B0603020202020204" pitchFamily="34" charset="0"/>
+            </a:endParaRPr>
+          </a:p>
+        </p:txBody>
+      </p:sp>
+    </p:spTree>
+    <p:extLst>
+      <p:ext uri="{BB962C8B-B14F-4D97-AF65-F5344CB8AC3E}">
+        <p14:creationId xmlns:p14="http://schemas.microsoft.com/office/powerpoint/2010/main" val="1508900828"/>
+      </p:ext>
+    </p:extLst>
+  </p:cSld>
+  <p:clrMapOvr>
+    <a:masterClrMapping/>
+  </p:clrMapOvr>
+</p:sld>
+</file>
+
+<file path=ppt/slides/slide12.xml><?xml version="1.0" encoding="utf-8"?>
+<p:sld xmlns:a="http://schemas.openxmlformats.org/drawingml/2006/main" xmlns:r="http://schemas.openxmlformats.org/officeDocument/2006/relationships" xmlns:p="http://schemas.openxmlformats.org/presentationml/2006/main">
+  <p:cSld>
+    <p:spTree>
+      <p:nvGrpSpPr>
+        <p:cNvPr id="1" name="">
+          <a:extLst>
+            <a:ext uri="{FF2B5EF4-FFF2-40B4-BE49-F238E27FC236}">
+              <a16:creationId xmlns:a16="http://schemas.microsoft.com/office/drawing/2014/main" id="{C1D6E782-E566-B3E3-F301-D427CB31128B}"/>
+            </a:ext>
+          </a:extLst>
+        </p:cNvPr>
+        <p:cNvGrpSpPr/>
+        <p:nvPr/>
+      </p:nvGrpSpPr>
+      <p:grpSpPr>
+        <a:xfrm>
+          <a:off x="0" y="0"/>
+          <a:ext cx="0" cy="0"/>
+          <a:chOff x="0" y="0"/>
+          <a:chExt cx="0" cy="0"/>
+        </a:xfrm>
+      </p:grpSpPr>
+      <p:pic>
+        <p:nvPicPr>
+          <p:cNvPr id="4" name="Online Media 3" title="Protest end">
+            <a:hlinkClick r:id="" action="ppaction://media"/>
+            <a:extLst>
+              <a:ext uri="{FF2B5EF4-FFF2-40B4-BE49-F238E27FC236}">
+                <a16:creationId xmlns:a16="http://schemas.microsoft.com/office/drawing/2014/main" id="{6DAB5003-6DBD-CFFF-6B48-4FEFB2FAD06A}"/>
+              </a:ext>
+            </a:extLst>
+          </p:cNvPr>
+          <p:cNvPicPr>
+            <a:picLocks noGrp="1" noRot="1" noChangeAspect="1"/>
+          </p:cNvPicPr>
+          <p:nvPr>
+            <p:ph idx="1"/>
+            <a:videoFile r:link="rId1"/>
+          </p:nvPr>
+        </p:nvPicPr>
+        <p:blipFill>
+          <a:blip r:embed="rId3"/>
+          <a:stretch>
+            <a:fillRect/>
+          </a:stretch>
+        </p:blipFill>
+        <p:spPr>
+          <a:xfrm>
+            <a:off x="1860873" y="1822424"/>
+            <a:ext cx="8022579" cy="4473036"/>
+          </a:xfrm>
+        </p:spPr>
+      </p:pic>
+      <p:sp>
+        <p:nvSpPr>
+          <p:cNvPr id="2" name="Title 1">
+            <a:extLst>
+              <a:ext uri="{FF2B5EF4-FFF2-40B4-BE49-F238E27FC236}">
+                <a16:creationId xmlns:a16="http://schemas.microsoft.com/office/drawing/2014/main" id="{1FE6C1E6-E6A6-ADAA-F14A-E3D9EA6E60D0}"/>
+              </a:ext>
+            </a:extLst>
+          </p:cNvPr>
+          <p:cNvSpPr>
+            <a:spLocks noGrp="1"/>
+          </p:cNvSpPr>
+          <p:nvPr>
+            <p:ph type="title"/>
+          </p:nvPr>
+        </p:nvSpPr>
+        <p:spPr/>
+        <p:txBody>
+          <a:bodyPr/>
+          <a:lstStyle/>
+          <a:p>
+            <a:r>
+              <a:rPr lang="en-US" dirty="0">
+                <a:latin typeface="Trebuchet MS"/>
+              </a:rPr>
+              <a:t>Protest simulation</a:t>
+            </a:r>
+            <a:endParaRPr lang="en-US" dirty="0"/>
+          </a:p>
+        </p:txBody>
+      </p:sp>
+    </p:spTree>
+    <p:extLst>
+      <p:ext uri="{BB962C8B-B14F-4D97-AF65-F5344CB8AC3E}">
+        <p14:creationId xmlns:p14="http://schemas.microsoft.com/office/powerpoint/2010/main" val="2511721973"/>
+      </p:ext>
+    </p:extLst>
+  </p:cSld>
+  <p:clrMapOvr>
+    <a:masterClrMapping/>
+  </p:clrMapOvr>
+</p:sld>
+</file>
+
+<file path=ppt/slides/slide13.xml><?xml version="1.0" encoding="utf-8"?>
+<p:sld xmlns:a="http://schemas.openxmlformats.org/drawingml/2006/main" xmlns:r="http://schemas.openxmlformats.org/officeDocument/2006/relationships" xmlns:p="http://schemas.openxmlformats.org/presentationml/2006/main">
+  <p:cSld>
+    <p:spTree>
+      <p:nvGrpSpPr>
+        <p:cNvPr id="1" name="">
+          <a:extLst>
+            <a:ext uri="{FF2B5EF4-FFF2-40B4-BE49-F238E27FC236}">
+              <a16:creationId xmlns:a16="http://schemas.microsoft.com/office/drawing/2014/main" id="{9238F1D7-EE7E-3455-733C-4E308796772E}"/>
+            </a:ext>
+          </a:extLst>
+        </p:cNvPr>
+        <p:cNvGrpSpPr/>
+        <p:nvPr/>
+      </p:nvGrpSpPr>
+      <p:grpSpPr>
+        <a:xfrm>
+          <a:off x="0" y="0"/>
+          <a:ext cx="0" cy="0"/>
+          <a:chOff x="0" y="0"/>
+          <a:chExt cx="0" cy="0"/>
+        </a:xfrm>
+      </p:grpSpPr>
+      <p:sp>
+        <p:nvSpPr>
+          <p:cNvPr id="2" name="Title 1">
+            <a:extLst>
+              <a:ext uri="{FF2B5EF4-FFF2-40B4-BE49-F238E27FC236}">
+                <a16:creationId xmlns:a16="http://schemas.microsoft.com/office/drawing/2014/main" id="{73DA8B9E-6130-D1C4-223F-5115E659EB7C}"/>
+              </a:ext>
+            </a:extLst>
+          </p:cNvPr>
+          <p:cNvSpPr>
+            <a:spLocks noGrp="1"/>
+          </p:cNvSpPr>
+          <p:nvPr>
+            <p:ph type="title"/>
+          </p:nvPr>
+        </p:nvSpPr>
+        <p:spPr/>
+        <p:txBody>
+          <a:bodyPr/>
+          <a:lstStyle/>
+          <a:p>
+            <a:r>
+              <a:rPr lang="en-US" dirty="0">
+                <a:latin typeface="Trebuchet MS" panose="020B0603020202020204" pitchFamily="34" charset="0"/>
+              </a:rPr>
+              <a:t>Results</a:t>
+            </a:r>
+          </a:p>
+        </p:txBody>
+      </p:sp>
+      <p:sp>
+        <p:nvSpPr>
+          <p:cNvPr id="3" name="Content Placeholder 2">
+            <a:extLst>
+              <a:ext uri="{FF2B5EF4-FFF2-40B4-BE49-F238E27FC236}">
+                <a16:creationId xmlns:a16="http://schemas.microsoft.com/office/drawing/2014/main" id="{FC607E13-5D85-7B89-57D8-D52A7634453B}"/>
+              </a:ext>
+            </a:extLst>
+          </p:cNvPr>
+          <p:cNvSpPr>
+            <a:spLocks noGrp="1"/>
+          </p:cNvSpPr>
+          <p:nvPr>
+            <p:ph idx="1"/>
+          </p:nvPr>
+        </p:nvSpPr>
+        <p:spPr/>
+        <p:txBody>
+          <a:bodyPr/>
+          <a:lstStyle/>
+          <a:p>
+            <a:r>
+              <a:rPr lang="en-US" dirty="0"/>
+              <a:t>Arbitrary movement for leader</a:t>
+            </a:r>
+          </a:p>
+          <a:p>
+            <a:endParaRPr lang="en-US" dirty="0"/>
+          </a:p>
+          <a:p>
+            <a:r>
+              <a:rPr lang="en-US" dirty="0"/>
+              <a:t>…video</a:t>
+            </a:r>
+          </a:p>
+        </p:txBody>
+      </p:sp>
+    </p:spTree>
+    <p:extLst>
+      <p:ext uri="{BB962C8B-B14F-4D97-AF65-F5344CB8AC3E}">
+        <p14:creationId xmlns:p14="http://schemas.microsoft.com/office/powerpoint/2010/main" val="4012959857"/>
+      </p:ext>
+    </p:extLst>
+  </p:cSld>
+  <p:clrMapOvr>
+    <a:masterClrMapping/>
+  </p:clrMapOvr>
+</p:sld>
+</file>
+
+<file path=ppt/slides/slide14.xml><?xml version="1.0" encoding="utf-8"?>
+<p:sld xmlns:a="http://schemas.openxmlformats.org/drawingml/2006/main" xmlns:r="http://schemas.openxmlformats.org/officeDocument/2006/relationships" xmlns:p="http://schemas.openxmlformats.org/presentationml/2006/main">
+  <p:cSld>
+    <p:spTree>
+      <p:nvGrpSpPr>
+        <p:cNvPr id="1" name="">
+          <a:extLst>
+            <a:ext uri="{FF2B5EF4-FFF2-40B4-BE49-F238E27FC236}">
+              <a16:creationId xmlns:a16="http://schemas.microsoft.com/office/drawing/2014/main" id="{C1D6E782-E566-B3E3-F301-D427CB31128B}"/>
+            </a:ext>
+          </a:extLst>
+        </p:cNvPr>
+        <p:cNvGrpSpPr/>
+        <p:nvPr/>
+      </p:nvGrpSpPr>
+      <p:grpSpPr>
+        <a:xfrm>
+          <a:off x="0" y="0"/>
+          <a:ext cx="0" cy="0"/>
+          <a:chOff x="0" y="0"/>
+          <a:chExt cx="0" cy="0"/>
+        </a:xfrm>
+      </p:grpSpPr>
       <p:sp>
         <p:nvSpPr>
           <p:cNvPr id="2" name="Title 1">
@@ -4103,7 +4414,7 @@
 </p:sld>
 </file>
 
-<file path=ppt/slides/slide12.xml><?xml version="1.0" encoding="utf-8"?>
+<file path=ppt/slides/slide15.xml><?xml version="1.0" encoding="utf-8"?>
 <p:sld xmlns:a="http://schemas.openxmlformats.org/drawingml/2006/main" xmlns:r="http://schemas.openxmlformats.org/officeDocument/2006/relationships" xmlns:p="http://schemas.openxmlformats.org/presentationml/2006/main">
   <p:cSld>
     <p:spTree>
@@ -4197,7 +4508,7 @@
 </p:sld>
 </file>
 
-<file path=ppt/slides/slide13.xml><?xml version="1.0" encoding="utf-8"?>
+<file path=ppt/slides/slide16.xml><?xml version="1.0" encoding="utf-8"?>
 <p:sld xmlns:a="http://schemas.openxmlformats.org/drawingml/2006/main" xmlns:r="http://schemas.openxmlformats.org/officeDocument/2006/relationships" xmlns:p="http://schemas.openxmlformats.org/presentationml/2006/main">
   <p:cSld>
     <p:spTree>
@@ -4330,7 +4641,7 @@
 </p:sld>
 </file>
 
-<file path=ppt/slides/slide14.xml><?xml version="1.0" encoding="utf-8"?>
+<file path=ppt/slides/slide17.xml><?xml version="1.0" encoding="utf-8"?>
 <p:sld xmlns:a="http://schemas.openxmlformats.org/drawingml/2006/main" xmlns:r="http://schemas.openxmlformats.org/officeDocument/2006/relationships" xmlns:p="http://schemas.openxmlformats.org/presentationml/2006/main">
   <p:cSld>
     <p:spTree>
@@ -5378,73 +5689,46 @@
           <a:p>
             <a:r>
               <a:rPr lang="en-US" dirty="0">
-                <a:latin typeface="Trebuchet MS" panose="020B0603020202020204" pitchFamily="34" charset="0"/>
+                <a:latin typeface="Trebuchet MS"/>
               </a:rPr>
-              <a:t>Results</a:t>
-            </a:r>
-          </a:p>
-        </p:txBody>
-      </p:sp>
-      <p:sp>
-        <p:nvSpPr>
-          <p:cNvPr id="3" name="Content Placeholder 2">
-            <a:extLst>
-              <a:ext uri="{FF2B5EF4-FFF2-40B4-BE49-F238E27FC236}">
-                <a16:creationId xmlns:a16="http://schemas.microsoft.com/office/drawing/2014/main" id="{84FB7D66-D812-7573-8EA3-B356A3485A7D}"/>
-              </a:ext>
-            </a:extLst>
-          </p:cNvPr>
-          <p:cNvSpPr>
-            <a:spLocks noGrp="1"/>
-          </p:cNvSpPr>
-          <p:nvPr>
-            <p:ph idx="1"/>
-          </p:nvPr>
-        </p:nvSpPr>
-        <p:spPr/>
-        <p:txBody>
-          <a:bodyPr/>
-          <a:lstStyle/>
-          <a:p>
-            <a:r>
-              <a:rPr lang="en-US" dirty="0"/>
-              <a:t>Effects of End-position-seeking-</a:t>
-            </a:r>
-            <a:r>
-              <a:rPr lang="en-US" dirty="0" err="1"/>
+              <a:t>End-position-seeking-</a:t>
+            </a:r>
+            <a:r>
+              <a:rPr lang="en-US" dirty="0" err="1">
+                <a:latin typeface="Trebuchet MS"/>
+              </a:rPr>
               <a:t>behaviour</a:t>
             </a:r>
-            <a:endParaRPr lang="en-US" dirty="0"/>
-          </a:p>
-          <a:p>
-            <a:endParaRPr lang="en-US" dirty="0"/>
           </a:p>
         </p:txBody>
       </p:sp>
       <p:pic>
         <p:nvPicPr>
-          <p:cNvPr id="6" name="Picture 5">
-            <a:extLst>
-              <a:ext uri="{FF2B5EF4-FFF2-40B4-BE49-F238E27FC236}">
-                <a16:creationId xmlns:a16="http://schemas.microsoft.com/office/drawing/2014/main" id="{9A951776-7EC4-61B6-F662-FFC1DAE8E091}"/>
+          <p:cNvPr id="6" name="Online Media 3" title="Protest Formation">
+            <a:hlinkClick r:id="" action="ppaction://media"/>
+            <a:extLst>
+              <a:ext uri="{FF2B5EF4-FFF2-40B4-BE49-F238E27FC236}">
+                <a16:creationId xmlns:a16="http://schemas.microsoft.com/office/drawing/2014/main" id="{139FC1B7-D91F-8108-3784-DD0F9639ACB8}"/>
               </a:ext>
             </a:extLst>
           </p:cNvPr>
           <p:cNvPicPr>
-            <a:picLocks noChangeAspect="1"/>
+            <a:picLocks noRot="1" noChangeAspect="1"/>
           </p:cNvPicPr>
-          <p:nvPr/>
+          <p:nvPr>
+            <a:videoFile r:link="rId1"/>
+          </p:nvPr>
         </p:nvPicPr>
         <p:blipFill>
-          <a:blip r:embed="rId2"/>
+          <a:blip r:embed="rId3"/>
           <a:stretch>
             <a:fillRect/>
           </a:stretch>
         </p:blipFill>
         <p:spPr>
           <a:xfrm>
-            <a:off x="0" y="2649758"/>
-            <a:ext cx="12192000" cy="4048763"/>
+            <a:off x="1859359" y="1826523"/>
+            <a:ext cx="8013699" cy="4529137"/>
           </a:xfrm>
           <a:prstGeom prst="rect">
             <a:avLst/>
@@ -5454,7 +5738,7 @@
     </p:spTree>
     <p:extLst>
       <p:ext uri="{BB962C8B-B14F-4D97-AF65-F5344CB8AC3E}">
-        <p14:creationId xmlns:p14="http://schemas.microsoft.com/office/powerpoint/2010/main" val="1324369122"/>
+        <p14:creationId xmlns:p14="http://schemas.microsoft.com/office/powerpoint/2010/main" val="1642649021"/>
       </p:ext>
     </p:extLst>
   </p:cSld>

</xml_diff>